<commit_message>
Remove Alarm from diagram, no longer used for autoscaling.
</commit_message>
<xml_diff>
--- a/docs/deployment_guide/images/darktrace-vsensor-architecture-diagram.pptx
+++ b/docs/deployment_guide/images/darktrace-vsensor-architecture-diagram.pptx
@@ -1,9 +1,12 @@
 
 <file path=ppt/presentation.xml><?xml version="1.0" encoding="utf-8"?>
-<p:presentation xmlns:a="http://schemas.openxmlformats.org/drawingml/2006/main" xmlns:r="http://schemas.openxmlformats.org/officeDocument/2006/relationships" xmlns:p="http://schemas.openxmlformats.org/presentationml/2006/main" saveSubsetFonts="1">
+<p:presentation xmlns:a="http://schemas.openxmlformats.org/drawingml/2006/main" xmlns:r="http://schemas.openxmlformats.org/officeDocument/2006/relationships" xmlns:p="http://schemas.openxmlformats.org/presentationml/2006/main" showSpecialPlsOnTitleSld="0" saveSubsetFonts="1">
   <p:sldMasterIdLst>
     <p:sldMasterId id="2147483648" r:id="rId1"/>
   </p:sldMasterIdLst>
+  <p:notesMasterIdLst>
+    <p:notesMasterId r:id="rId3"/>
+  </p:notesMasterIdLst>
   <p:sldIdLst>
     <p:sldId id="264" r:id="rId2"/>
   </p:sldIdLst>
@@ -112,6 +115,356 @@
 </p:presentation>
 </file>
 
+<file path=ppt/notesMasters/notesMaster1.xml><?xml version="1.0" encoding="utf-8"?>
+<p:notesMaster xmlns:a="http://schemas.openxmlformats.org/drawingml/2006/main" xmlns:r="http://schemas.openxmlformats.org/officeDocument/2006/relationships" xmlns:p="http://schemas.openxmlformats.org/presentationml/2006/main">
+  <p:cSld>
+    <p:bg>
+      <p:bgRef idx="1001">
+        <a:schemeClr val="bg1"/>
+      </p:bgRef>
+    </p:bg>
+    <p:spTree>
+      <p:nvGrpSpPr>
+        <p:cNvPr id="1" name=""/>
+        <p:cNvGrpSpPr/>
+        <p:nvPr/>
+      </p:nvGrpSpPr>
+      <p:grpSpPr>
+        <a:xfrm>
+          <a:off x="0" y="0"/>
+          <a:ext cx="0" cy="0"/>
+          <a:chOff x="0" y="0"/>
+          <a:chExt cx="0" cy="0"/>
+        </a:xfrm>
+      </p:grpSpPr>
+      <p:sp>
+        <p:nvSpPr>
+          <p:cNvPr id="2" name="Header Placeholder 1"/>
+          <p:cNvSpPr>
+            <a:spLocks noGrp="1"/>
+          </p:cNvSpPr>
+          <p:nvPr>
+            <p:ph type="hdr" sz="quarter"/>
+          </p:nvPr>
+        </p:nvSpPr>
+        <p:spPr>
+          <a:xfrm>
+            <a:off x="0" y="0"/>
+            <a:ext cx="2971800" cy="458788"/>
+          </a:xfrm>
+          <a:prstGeom prst="rect">
+            <a:avLst/>
+          </a:prstGeom>
+        </p:spPr>
+        <p:txBody>
+          <a:bodyPr vert="horz" lIns="91440" tIns="45720" rIns="91440" bIns="45720" rtlCol="0"/>
+          <a:lstStyle>
+            <a:lvl1pPr algn="l">
+              <a:defRPr sz="1200"/>
+            </a:lvl1pPr>
+          </a:lstStyle>
+          <a:p>
+            <a:endParaRPr lang="en-US"/>
+          </a:p>
+        </p:txBody>
+      </p:sp>
+      <p:sp>
+        <p:nvSpPr>
+          <p:cNvPr id="3" name="Date Placeholder 2"/>
+          <p:cNvSpPr>
+            <a:spLocks noGrp="1"/>
+          </p:cNvSpPr>
+          <p:nvPr>
+            <p:ph type="dt" idx="1"/>
+          </p:nvPr>
+        </p:nvSpPr>
+        <p:spPr>
+          <a:xfrm>
+            <a:off x="3884613" y="0"/>
+            <a:ext cx="2971800" cy="458788"/>
+          </a:xfrm>
+          <a:prstGeom prst="rect">
+            <a:avLst/>
+          </a:prstGeom>
+        </p:spPr>
+        <p:txBody>
+          <a:bodyPr vert="horz" lIns="91440" tIns="45720" rIns="91440" bIns="45720" rtlCol="0"/>
+          <a:lstStyle>
+            <a:lvl1pPr algn="r">
+              <a:defRPr sz="1200"/>
+            </a:lvl1pPr>
+          </a:lstStyle>
+          <a:p>
+            <a:fld id="{3EE5D166-DC13-7648-A242-AA94E0066721}" type="datetimeFigureOut">
+              <a:rPr lang="en-US" smtClean="0"/>
+              <a:t>8/7/23</a:t>
+            </a:fld>
+            <a:endParaRPr lang="en-US"/>
+          </a:p>
+        </p:txBody>
+      </p:sp>
+      <p:sp>
+        <p:nvSpPr>
+          <p:cNvPr id="4" name="Slide Image Placeholder 3"/>
+          <p:cNvSpPr>
+            <a:spLocks noGrp="1" noRot="1" noChangeAspect="1"/>
+          </p:cNvSpPr>
+          <p:nvPr>
+            <p:ph type="sldImg" idx="2"/>
+          </p:nvPr>
+        </p:nvSpPr>
+        <p:spPr>
+          <a:xfrm>
+            <a:off x="685800" y="1143000"/>
+            <a:ext cx="5486400" cy="3086100"/>
+          </a:xfrm>
+          <a:prstGeom prst="rect">
+            <a:avLst/>
+          </a:prstGeom>
+          <a:noFill/>
+          <a:ln w="12700">
+            <a:solidFill>
+              <a:prstClr val="black"/>
+            </a:solidFill>
+          </a:ln>
+        </p:spPr>
+        <p:txBody>
+          <a:bodyPr vert="horz" lIns="91440" tIns="45720" rIns="91440" bIns="45720" rtlCol="0" anchor="ctr"/>
+          <a:lstStyle/>
+          <a:p>
+            <a:endParaRPr lang="en-US"/>
+          </a:p>
+        </p:txBody>
+      </p:sp>
+      <p:sp>
+        <p:nvSpPr>
+          <p:cNvPr id="5" name="Notes Placeholder 4"/>
+          <p:cNvSpPr>
+            <a:spLocks noGrp="1"/>
+          </p:cNvSpPr>
+          <p:nvPr>
+            <p:ph type="body" sz="quarter" idx="3"/>
+          </p:nvPr>
+        </p:nvSpPr>
+        <p:spPr>
+          <a:xfrm>
+            <a:off x="685800" y="4400550"/>
+            <a:ext cx="5486400" cy="3600450"/>
+          </a:xfrm>
+          <a:prstGeom prst="rect">
+            <a:avLst/>
+          </a:prstGeom>
+        </p:spPr>
+        <p:txBody>
+          <a:bodyPr vert="horz" lIns="91440" tIns="45720" rIns="91440" bIns="45720" rtlCol="0"/>
+          <a:lstStyle/>
+          <a:p>
+            <a:pPr lvl="0"/>
+            <a:r>
+              <a:rPr lang="en-GB"/>
+              <a:t>Click to edit Master text styles</a:t>
+            </a:r>
+          </a:p>
+          <a:p>
+            <a:pPr lvl="1"/>
+            <a:r>
+              <a:rPr lang="en-GB"/>
+              <a:t>Second level</a:t>
+            </a:r>
+          </a:p>
+          <a:p>
+            <a:pPr lvl="2"/>
+            <a:r>
+              <a:rPr lang="en-GB"/>
+              <a:t>Third level</a:t>
+            </a:r>
+          </a:p>
+          <a:p>
+            <a:pPr lvl="3"/>
+            <a:r>
+              <a:rPr lang="en-GB"/>
+              <a:t>Fourth level</a:t>
+            </a:r>
+          </a:p>
+          <a:p>
+            <a:pPr lvl="4"/>
+            <a:r>
+              <a:rPr lang="en-GB"/>
+              <a:t>Fifth level</a:t>
+            </a:r>
+            <a:endParaRPr lang="en-US"/>
+          </a:p>
+        </p:txBody>
+      </p:sp>
+      <p:sp>
+        <p:nvSpPr>
+          <p:cNvPr id="6" name="Footer Placeholder 5"/>
+          <p:cNvSpPr>
+            <a:spLocks noGrp="1"/>
+          </p:cNvSpPr>
+          <p:nvPr>
+            <p:ph type="ftr" sz="quarter" idx="4"/>
+          </p:nvPr>
+        </p:nvSpPr>
+        <p:spPr>
+          <a:xfrm>
+            <a:off x="0" y="8685213"/>
+            <a:ext cx="2971800" cy="458787"/>
+          </a:xfrm>
+          <a:prstGeom prst="rect">
+            <a:avLst/>
+          </a:prstGeom>
+        </p:spPr>
+        <p:txBody>
+          <a:bodyPr vert="horz" lIns="91440" tIns="45720" rIns="91440" bIns="45720" rtlCol="0" anchor="b"/>
+          <a:lstStyle>
+            <a:lvl1pPr algn="l">
+              <a:defRPr sz="1200"/>
+            </a:lvl1pPr>
+          </a:lstStyle>
+          <a:p>
+            <a:endParaRPr lang="en-US"/>
+          </a:p>
+        </p:txBody>
+      </p:sp>
+      <p:sp>
+        <p:nvSpPr>
+          <p:cNvPr id="7" name="Slide Number Placeholder 6"/>
+          <p:cNvSpPr>
+            <a:spLocks noGrp="1"/>
+          </p:cNvSpPr>
+          <p:nvPr>
+            <p:ph type="sldNum" sz="quarter" idx="5"/>
+          </p:nvPr>
+        </p:nvSpPr>
+        <p:spPr>
+          <a:xfrm>
+            <a:off x="3884613" y="8685213"/>
+            <a:ext cx="2971800" cy="458787"/>
+          </a:xfrm>
+          <a:prstGeom prst="rect">
+            <a:avLst/>
+          </a:prstGeom>
+        </p:spPr>
+        <p:txBody>
+          <a:bodyPr vert="horz" lIns="91440" tIns="45720" rIns="91440" bIns="45720" rtlCol="0" anchor="b"/>
+          <a:lstStyle>
+            <a:lvl1pPr algn="r">
+              <a:defRPr sz="1200"/>
+            </a:lvl1pPr>
+          </a:lstStyle>
+          <a:p>
+            <a:fld id="{FCB0092C-8CBD-BB46-B176-6442EFCDEAAB}" type="slidenum">
+              <a:rPr lang="en-US" smtClean="0"/>
+              <a:t>‹#›</a:t>
+            </a:fld>
+            <a:endParaRPr lang="en-US"/>
+          </a:p>
+        </p:txBody>
+      </p:sp>
+    </p:spTree>
+    <p:extLst>
+      <p:ext uri="{BB962C8B-B14F-4D97-AF65-F5344CB8AC3E}">
+        <p14:creationId xmlns:p14="http://schemas.microsoft.com/office/powerpoint/2010/main" val="4106852791"/>
+      </p:ext>
+    </p:extLst>
+  </p:cSld>
+  <p:clrMap bg1="lt1" tx1="dk1" bg2="lt2" tx2="dk2" accent1="accent1" accent2="accent2" accent3="accent3" accent4="accent4" accent5="accent5" accent6="accent6" hlink="hlink" folHlink="folHlink"/>
+  <p:notesStyle>
+    <a:lvl1pPr marL="0" algn="l" defTabSz="914400" rtl="0" eaLnBrk="1" latinLnBrk="0" hangingPunct="1">
+      <a:defRPr sz="1200" kern="1200">
+        <a:solidFill>
+          <a:schemeClr val="tx1"/>
+        </a:solidFill>
+        <a:latin typeface="+mn-lt"/>
+        <a:ea typeface="+mn-ea"/>
+        <a:cs typeface="+mn-cs"/>
+      </a:defRPr>
+    </a:lvl1pPr>
+    <a:lvl2pPr marL="457200" algn="l" defTabSz="914400" rtl="0" eaLnBrk="1" latinLnBrk="0" hangingPunct="1">
+      <a:defRPr sz="1200" kern="1200">
+        <a:solidFill>
+          <a:schemeClr val="tx1"/>
+        </a:solidFill>
+        <a:latin typeface="+mn-lt"/>
+        <a:ea typeface="+mn-ea"/>
+        <a:cs typeface="+mn-cs"/>
+      </a:defRPr>
+    </a:lvl2pPr>
+    <a:lvl3pPr marL="914400" algn="l" defTabSz="914400" rtl="0" eaLnBrk="1" latinLnBrk="0" hangingPunct="1">
+      <a:defRPr sz="1200" kern="1200">
+        <a:solidFill>
+          <a:schemeClr val="tx1"/>
+        </a:solidFill>
+        <a:latin typeface="+mn-lt"/>
+        <a:ea typeface="+mn-ea"/>
+        <a:cs typeface="+mn-cs"/>
+      </a:defRPr>
+    </a:lvl3pPr>
+    <a:lvl4pPr marL="1371600" algn="l" defTabSz="914400" rtl="0" eaLnBrk="1" latinLnBrk="0" hangingPunct="1">
+      <a:defRPr sz="1200" kern="1200">
+        <a:solidFill>
+          <a:schemeClr val="tx1"/>
+        </a:solidFill>
+        <a:latin typeface="+mn-lt"/>
+        <a:ea typeface="+mn-ea"/>
+        <a:cs typeface="+mn-cs"/>
+      </a:defRPr>
+    </a:lvl4pPr>
+    <a:lvl5pPr marL="1828800" algn="l" defTabSz="914400" rtl="0" eaLnBrk="1" latinLnBrk="0" hangingPunct="1">
+      <a:defRPr sz="1200" kern="1200">
+        <a:solidFill>
+          <a:schemeClr val="tx1"/>
+        </a:solidFill>
+        <a:latin typeface="+mn-lt"/>
+        <a:ea typeface="+mn-ea"/>
+        <a:cs typeface="+mn-cs"/>
+      </a:defRPr>
+    </a:lvl5pPr>
+    <a:lvl6pPr marL="2286000" algn="l" defTabSz="914400" rtl="0" eaLnBrk="1" latinLnBrk="0" hangingPunct="1">
+      <a:defRPr sz="1200" kern="1200">
+        <a:solidFill>
+          <a:schemeClr val="tx1"/>
+        </a:solidFill>
+        <a:latin typeface="+mn-lt"/>
+        <a:ea typeface="+mn-ea"/>
+        <a:cs typeface="+mn-cs"/>
+      </a:defRPr>
+    </a:lvl6pPr>
+    <a:lvl7pPr marL="2743200" algn="l" defTabSz="914400" rtl="0" eaLnBrk="1" latinLnBrk="0" hangingPunct="1">
+      <a:defRPr sz="1200" kern="1200">
+        <a:solidFill>
+          <a:schemeClr val="tx1"/>
+        </a:solidFill>
+        <a:latin typeface="+mn-lt"/>
+        <a:ea typeface="+mn-ea"/>
+        <a:cs typeface="+mn-cs"/>
+      </a:defRPr>
+    </a:lvl7pPr>
+    <a:lvl8pPr marL="3200400" algn="l" defTabSz="914400" rtl="0" eaLnBrk="1" latinLnBrk="0" hangingPunct="1">
+      <a:defRPr sz="1200" kern="1200">
+        <a:solidFill>
+          <a:schemeClr val="tx1"/>
+        </a:solidFill>
+        <a:latin typeface="+mn-lt"/>
+        <a:ea typeface="+mn-ea"/>
+        <a:cs typeface="+mn-cs"/>
+      </a:defRPr>
+    </a:lvl8pPr>
+    <a:lvl9pPr marL="3657600" algn="l" defTabSz="914400" rtl="0" eaLnBrk="1" latinLnBrk="0" hangingPunct="1">
+      <a:defRPr sz="1200" kern="1200">
+        <a:solidFill>
+          <a:schemeClr val="tx1"/>
+        </a:solidFill>
+        <a:latin typeface="+mn-lt"/>
+        <a:ea typeface="+mn-ea"/>
+        <a:cs typeface="+mn-cs"/>
+      </a:defRPr>
+    </a:lvl9pPr>
+  </p:notesStyle>
+</p:notesMaster>
+</file>
+
 <file path=ppt/slideLayouts/slideLayout1.xml><?xml version="1.0" encoding="utf-8"?>
 <p:sldLayout xmlns:a="http://schemas.openxmlformats.org/drawingml/2006/main" xmlns:r="http://schemas.openxmlformats.org/officeDocument/2006/relationships" xmlns:p="http://schemas.openxmlformats.org/presentationml/2006/main" type="title" preserve="1">
   <p:cSld name="Title Slide">
@@ -239,9 +592,9 @@
           <a:bodyPr/>
           <a:lstStyle/>
           <a:p>
-            <a:fld id="{091DC170-1660-4809-9A15-62445EB0C7B1}" type="datetimeFigureOut">
-              <a:rPr lang="en-US" smtClean="0"/>
-              <a:t>7/27/2022</a:t>
+            <a:fld id="{C288606C-66EA-F346-A769-4569CAB8A7FE}" type="datetime1">
+              <a:rPr lang="en-GB" smtClean="0"/>
+              <a:t>07/08/2023</a:t>
             </a:fld>
             <a:endParaRPr lang="en-US"/>
           </a:p>
@@ -407,9 +760,9 @@
           <a:bodyPr/>
           <a:lstStyle/>
           <a:p>
-            <a:fld id="{091DC170-1660-4809-9A15-62445EB0C7B1}" type="datetimeFigureOut">
-              <a:rPr lang="en-US" smtClean="0"/>
-              <a:t>7/27/2022</a:t>
+            <a:fld id="{95B31FE2-BABE-C149-8B70-7C3E8A7DF869}" type="datetime1">
+              <a:rPr lang="en-GB" smtClean="0"/>
+              <a:t>07/08/2023</a:t>
             </a:fld>
             <a:endParaRPr lang="en-US"/>
           </a:p>
@@ -585,9 +938,9 @@
           <a:bodyPr/>
           <a:lstStyle/>
           <a:p>
-            <a:fld id="{091DC170-1660-4809-9A15-62445EB0C7B1}" type="datetimeFigureOut">
-              <a:rPr lang="en-US" smtClean="0"/>
-              <a:t>7/27/2022</a:t>
+            <a:fld id="{3B43115A-3D21-7543-9B6A-CA76F4122AFE}" type="datetime1">
+              <a:rPr lang="en-GB" smtClean="0"/>
+              <a:t>07/08/2023</a:t>
             </a:fld>
             <a:endParaRPr lang="en-US"/>
           </a:p>
@@ -753,9 +1106,9 @@
           <a:bodyPr/>
           <a:lstStyle/>
           <a:p>
-            <a:fld id="{091DC170-1660-4809-9A15-62445EB0C7B1}" type="datetimeFigureOut">
-              <a:rPr lang="en-US" smtClean="0"/>
-              <a:t>7/27/2022</a:t>
+            <a:fld id="{DF222077-87AF-0047-8789-8B8456756073}" type="datetime1">
+              <a:rPr lang="en-GB" smtClean="0"/>
+              <a:t>07/08/2023</a:t>
             </a:fld>
             <a:endParaRPr lang="en-US"/>
           </a:p>
@@ -998,9 +1351,9 @@
           <a:bodyPr/>
           <a:lstStyle/>
           <a:p>
-            <a:fld id="{091DC170-1660-4809-9A15-62445EB0C7B1}" type="datetimeFigureOut">
-              <a:rPr lang="en-US" smtClean="0"/>
-              <a:t>7/27/2022</a:t>
+            <a:fld id="{584691CB-D1E4-4A47-9794-31D2C461C1E2}" type="datetime1">
+              <a:rPr lang="en-GB" smtClean="0"/>
+              <a:t>07/08/2023</a:t>
             </a:fld>
             <a:endParaRPr lang="en-US"/>
           </a:p>
@@ -1227,9 +1580,9 @@
           <a:bodyPr/>
           <a:lstStyle/>
           <a:p>
-            <a:fld id="{091DC170-1660-4809-9A15-62445EB0C7B1}" type="datetimeFigureOut">
-              <a:rPr lang="en-US" smtClean="0"/>
-              <a:t>7/27/2022</a:t>
+            <a:fld id="{B268B2F0-B352-004C-AB96-F0B66574AA8A}" type="datetime1">
+              <a:rPr lang="en-GB" smtClean="0"/>
+              <a:t>07/08/2023</a:t>
             </a:fld>
             <a:endParaRPr lang="en-US"/>
           </a:p>
@@ -1591,9 +1944,9 @@
           <a:bodyPr/>
           <a:lstStyle/>
           <a:p>
-            <a:fld id="{091DC170-1660-4809-9A15-62445EB0C7B1}" type="datetimeFigureOut">
-              <a:rPr lang="en-US" smtClean="0"/>
-              <a:t>7/27/2022</a:t>
+            <a:fld id="{52973A3F-6CDC-5F41-AB12-5647BCC1F5EA}" type="datetime1">
+              <a:rPr lang="en-GB" smtClean="0"/>
+              <a:t>07/08/2023</a:t>
             </a:fld>
             <a:endParaRPr lang="en-US"/>
           </a:p>
@@ -1708,9 +2061,9 @@
           <a:bodyPr/>
           <a:lstStyle/>
           <a:p>
-            <a:fld id="{091DC170-1660-4809-9A15-62445EB0C7B1}" type="datetimeFigureOut">
-              <a:rPr lang="en-US" smtClean="0"/>
-              <a:t>7/27/2022</a:t>
+            <a:fld id="{8F276179-8031-A64D-BF6B-FD962A2E0325}" type="datetime1">
+              <a:rPr lang="en-GB" smtClean="0"/>
+              <a:t>07/08/2023</a:t>
             </a:fld>
             <a:endParaRPr lang="en-US"/>
           </a:p>
@@ -1803,9 +2156,9 @@
           <a:bodyPr/>
           <a:lstStyle/>
           <a:p>
-            <a:fld id="{091DC170-1660-4809-9A15-62445EB0C7B1}" type="datetimeFigureOut">
-              <a:rPr lang="en-US" smtClean="0"/>
-              <a:t>7/27/2022</a:t>
+            <a:fld id="{0BD047C0-5E4B-8D42-8860-BF2131E0B082}" type="datetime1">
+              <a:rPr lang="en-GB" smtClean="0"/>
+              <a:t>07/08/2023</a:t>
             </a:fld>
             <a:endParaRPr lang="en-US"/>
           </a:p>
@@ -2078,9 +2431,9 @@
           <a:bodyPr/>
           <a:lstStyle/>
           <a:p>
-            <a:fld id="{091DC170-1660-4809-9A15-62445EB0C7B1}" type="datetimeFigureOut">
-              <a:rPr lang="en-US" smtClean="0"/>
-              <a:t>7/27/2022</a:t>
+            <a:fld id="{BEE0AAC6-D00F-0A4D-ACF2-D746D80F57B7}" type="datetime1">
+              <a:rPr lang="en-GB" smtClean="0"/>
+              <a:t>07/08/2023</a:t>
             </a:fld>
             <a:endParaRPr lang="en-US"/>
           </a:p>
@@ -2330,9 +2683,9 @@
           <a:bodyPr/>
           <a:lstStyle/>
           <a:p>
-            <a:fld id="{091DC170-1660-4809-9A15-62445EB0C7B1}" type="datetimeFigureOut">
-              <a:rPr lang="en-US" smtClean="0"/>
-              <a:t>7/27/2022</a:t>
+            <a:fld id="{571BE75C-CC92-0C40-A000-07855BA8B50B}" type="datetime1">
+              <a:rPr lang="en-GB" smtClean="0"/>
+              <a:t>07/08/2023</a:t>
             </a:fld>
             <a:endParaRPr lang="en-US"/>
           </a:p>
@@ -2541,9 +2894,9 @@
             </a:lvl1pPr>
           </a:lstStyle>
           <a:p>
-            <a:fld id="{091DC170-1660-4809-9A15-62445EB0C7B1}" type="datetimeFigureOut">
-              <a:rPr lang="en-US" smtClean="0"/>
-              <a:t>7/27/2022</a:t>
+            <a:fld id="{71A86137-0D67-2449-936F-D286C18A43A7}" type="datetime1">
+              <a:rPr lang="en-GB" smtClean="0"/>
+              <a:t>07/08/2023</a:t>
             </a:fld>
             <a:endParaRPr lang="en-US"/>
           </a:p>
@@ -2624,6 +2977,100 @@
               <a:t>‹#›</a:t>
             </a:fld>
             <a:endParaRPr lang="en-US"/>
+          </a:p>
+        </p:txBody>
+      </p:sp>
+      <p:sp>
+        <p:nvSpPr>
+          <p:cNvPr id="9" name="TextBox 8">
+            <a:extLst>
+              <a:ext uri="{FF2B5EF4-FFF2-40B4-BE49-F238E27FC236}">
+                <a16:creationId xmlns:a16="http://schemas.microsoft.com/office/drawing/2014/main" id="{4B14BCAA-FA7A-2486-3D16-2C238D196D54}"/>
+              </a:ext>
+            </a:extLst>
+          </p:cNvPr>
+          <p:cNvSpPr txBox="1"/>
+          <p:nvPr>
+            <p:extLst>
+              <p:ext uri="{1162E1C5-73C7-4A58-AE30-91384D911F3F}">
+                <p184:classification xmlns:p184="http://schemas.microsoft.com/office/powerpoint/2018/4/main" val="hdr"/>
+              </p:ext>
+            </p:extLst>
+          </p:nvPr>
+        </p:nvSpPr>
+        <p:spPr>
+          <a:xfrm>
+            <a:off x="63500" y="63500"/>
+            <a:ext cx="509588" cy="152400"/>
+          </a:xfrm>
+          <a:prstGeom prst="rect">
+            <a:avLst/>
+          </a:prstGeom>
+        </p:spPr>
+        <p:txBody>
+          <a:bodyPr horzOverflow="overflow" lIns="0" tIns="0" rIns="0" bIns="0">
+            <a:spAutoFit/>
+          </a:bodyPr>
+          <a:lstStyle/>
+          <a:p>
+            <a:pPr algn="l"/>
+            <a:r>
+              <a:rPr lang="en-US" sz="1000">
+                <a:solidFill>
+                  <a:srgbClr val="000000"/>
+                </a:solidFill>
+                <a:latin typeface="Calibri" panose="020F0502020204030204" pitchFamily="34" charset="0"/>
+                <a:cs typeface="Calibri" panose="020F0502020204030204" pitchFamily="34" charset="0"/>
+              </a:rPr>
+              <a:t>     [DTL0]</a:t>
+            </a:r>
+          </a:p>
+        </p:txBody>
+      </p:sp>
+      <p:sp>
+        <p:nvSpPr>
+          <p:cNvPr id="10" name="TextBox 9">
+            <a:extLst>
+              <a:ext uri="{FF2B5EF4-FFF2-40B4-BE49-F238E27FC236}">
+                <a16:creationId xmlns:a16="http://schemas.microsoft.com/office/drawing/2014/main" id="{16F2D943-8AAD-FE0A-2DB3-F36D98B70E4F}"/>
+              </a:ext>
+            </a:extLst>
+          </p:cNvPr>
+          <p:cNvSpPr txBox="1"/>
+          <p:nvPr>
+            <p:extLst>
+              <p:ext uri="{1162E1C5-73C7-4A58-AE30-91384D911F3F}">
+                <p184:classification xmlns:p184="http://schemas.microsoft.com/office/powerpoint/2018/4/main" val="ftr"/>
+              </p:ext>
+            </p:extLst>
+          </p:nvPr>
+        </p:nvSpPr>
+        <p:spPr>
+          <a:xfrm>
+            <a:off x="63500" y="6642100"/>
+            <a:ext cx="509588" cy="152400"/>
+          </a:xfrm>
+          <a:prstGeom prst="rect">
+            <a:avLst/>
+          </a:prstGeom>
+        </p:spPr>
+        <p:txBody>
+          <a:bodyPr horzOverflow="overflow" lIns="0" tIns="0" rIns="0" bIns="0">
+            <a:spAutoFit/>
+          </a:bodyPr>
+          <a:lstStyle/>
+          <a:p>
+            <a:pPr algn="l"/>
+            <a:r>
+              <a:rPr lang="en-US" sz="1000">
+                <a:solidFill>
+                  <a:srgbClr val="000000"/>
+                </a:solidFill>
+                <a:latin typeface="Calibri" panose="020F0502020204030204" pitchFamily="34" charset="0"/>
+                <a:cs typeface="Calibri" panose="020F0502020204030204" pitchFamily="34" charset="0"/>
+              </a:rPr>
+              <a:t>     [DTL0]</a:t>
+            </a:r>
           </a:p>
         </p:txBody>
       </p:sp>
@@ -2648,6 +3095,7 @@
     <p:sldLayoutId id="2147483658" r:id="rId10"/>
     <p:sldLayoutId id="2147483659" r:id="rId11"/>
   </p:sldLayoutIdLst>
+  <p:hf sldNum="0" hdr="0" ftr="0" dt="0"/>
   <p:txStyles>
     <p:titleStyle>
       <a:lvl1pPr algn="l" defTabSz="914400" rtl="0" eaLnBrk="1" latinLnBrk="0" hangingPunct="1">
@@ -6453,227 +6901,6 @@
       </p:pic>
       <p:sp>
         <p:nvSpPr>
-          <p:cNvPr id="59" name="TextBox 16">
-            <a:extLst>
-              <a:ext uri="{FF2B5EF4-FFF2-40B4-BE49-F238E27FC236}">
-                <a16:creationId xmlns:a16="http://schemas.microsoft.com/office/drawing/2014/main" id="{9D55A238-F801-4828-B186-31BDC9EA47A2}"/>
-              </a:ext>
-            </a:extLst>
-          </p:cNvPr>
-          <p:cNvSpPr txBox="1">
-            <a:spLocks noChangeArrowheads="1"/>
-          </p:cNvSpPr>
-          <p:nvPr/>
-        </p:nvSpPr>
-        <p:spPr bwMode="auto">
-          <a:xfrm>
-            <a:off x="7922399" y="3309955"/>
-            <a:ext cx="1187450" cy="261610"/>
-          </a:xfrm>
-          <a:prstGeom prst="rect">
-            <a:avLst/>
-          </a:prstGeom>
-          <a:noFill/>
-          <a:ln>
-            <a:noFill/>
-          </a:ln>
-          <a:extLst>
-            <a:ext uri="{909E8E84-426E-40DD-AFC4-6F175D3DCCD1}">
-              <a14:hiddenFill xmlns:a14="http://schemas.microsoft.com/office/drawing/2010/main">
-                <a:solidFill>
-                  <a:srgbClr val="FFFFFF"/>
-                </a:solidFill>
-              </a14:hiddenFill>
-            </a:ext>
-            <a:ext uri="{91240B29-F687-4F45-9708-019B960494DF}">
-              <a14:hiddenLine xmlns:a14="http://schemas.microsoft.com/office/drawing/2010/main" w="9525">
-                <a:solidFill>
-                  <a:srgbClr val="000000"/>
-                </a:solidFill>
-                <a:miter lim="800000"/>
-                <a:headEnd/>
-                <a:tailEnd/>
-              </a14:hiddenLine>
-            </a:ext>
-          </a:extLst>
-        </p:spPr>
-        <p:txBody>
-          <a:bodyPr>
-            <a:spAutoFit/>
-          </a:bodyPr>
-          <a:lstStyle>
-            <a:lvl1pPr>
-              <a:defRPr>
-                <a:solidFill>
-                  <a:schemeClr val="tx1"/>
-                </a:solidFill>
-                <a:latin typeface="Calibri" panose="020F0502020204030204" pitchFamily="34" charset="0"/>
-              </a:defRPr>
-            </a:lvl1pPr>
-            <a:lvl2pPr marL="742950" indent="-285750">
-              <a:defRPr>
-                <a:solidFill>
-                  <a:schemeClr val="tx1"/>
-                </a:solidFill>
-                <a:latin typeface="Calibri" panose="020F0502020204030204" pitchFamily="34" charset="0"/>
-              </a:defRPr>
-            </a:lvl2pPr>
-            <a:lvl3pPr marL="1143000" indent="-228600">
-              <a:defRPr>
-                <a:solidFill>
-                  <a:schemeClr val="tx1"/>
-                </a:solidFill>
-                <a:latin typeface="Calibri" panose="020F0502020204030204" pitchFamily="34" charset="0"/>
-              </a:defRPr>
-            </a:lvl3pPr>
-            <a:lvl4pPr marL="1600200" indent="-228600">
-              <a:defRPr>
-                <a:solidFill>
-                  <a:schemeClr val="tx1"/>
-                </a:solidFill>
-                <a:latin typeface="Calibri" panose="020F0502020204030204" pitchFamily="34" charset="0"/>
-              </a:defRPr>
-            </a:lvl4pPr>
-            <a:lvl5pPr marL="2057400" indent="-228600">
-              <a:defRPr>
-                <a:solidFill>
-                  <a:schemeClr val="tx1"/>
-                </a:solidFill>
-                <a:latin typeface="Calibri" panose="020F0502020204030204" pitchFamily="34" charset="0"/>
-              </a:defRPr>
-            </a:lvl5pPr>
-            <a:lvl6pPr marL="2514600" indent="-228600" eaLnBrk="0" fontAlgn="base" hangingPunct="0">
-              <a:spcBef>
-                <a:spcPct val="0"/>
-              </a:spcBef>
-              <a:spcAft>
-                <a:spcPct val="0"/>
-              </a:spcAft>
-              <a:defRPr>
-                <a:solidFill>
-                  <a:schemeClr val="tx1"/>
-                </a:solidFill>
-                <a:latin typeface="Calibri" panose="020F0502020204030204" pitchFamily="34" charset="0"/>
-              </a:defRPr>
-            </a:lvl6pPr>
-            <a:lvl7pPr marL="2971800" indent="-228600" eaLnBrk="0" fontAlgn="base" hangingPunct="0">
-              <a:spcBef>
-                <a:spcPct val="0"/>
-              </a:spcBef>
-              <a:spcAft>
-                <a:spcPct val="0"/>
-              </a:spcAft>
-              <a:defRPr>
-                <a:solidFill>
-                  <a:schemeClr val="tx1"/>
-                </a:solidFill>
-                <a:latin typeface="Calibri" panose="020F0502020204030204" pitchFamily="34" charset="0"/>
-              </a:defRPr>
-            </a:lvl7pPr>
-            <a:lvl8pPr marL="3429000" indent="-228600" eaLnBrk="0" fontAlgn="base" hangingPunct="0">
-              <a:spcBef>
-                <a:spcPct val="0"/>
-              </a:spcBef>
-              <a:spcAft>
-                <a:spcPct val="0"/>
-              </a:spcAft>
-              <a:defRPr>
-                <a:solidFill>
-                  <a:schemeClr val="tx1"/>
-                </a:solidFill>
-                <a:latin typeface="Calibri" panose="020F0502020204030204" pitchFamily="34" charset="0"/>
-              </a:defRPr>
-            </a:lvl8pPr>
-            <a:lvl9pPr marL="3886200" indent="-228600" eaLnBrk="0" fontAlgn="base" hangingPunct="0">
-              <a:spcBef>
-                <a:spcPct val="0"/>
-              </a:spcBef>
-              <a:spcAft>
-                <a:spcPct val="0"/>
-              </a:spcAft>
-              <a:defRPr>
-                <a:solidFill>
-                  <a:schemeClr val="tx1"/>
-                </a:solidFill>
-                <a:latin typeface="Calibri" panose="020F0502020204030204" pitchFamily="34" charset="0"/>
-              </a:defRPr>
-            </a:lvl9pPr>
-          </a:lstStyle>
-          <a:p>
-            <a:pPr algn="ctr" eaLnBrk="1" hangingPunct="1"/>
-            <a:r>
-              <a:rPr lang="en-US" altLang="en-US" sz="1100" dirty="0">
-                <a:latin typeface="Arial" panose="020B0604020202020204" pitchFamily="34" charset="0"/>
-                <a:ea typeface="Amazon Ember" panose="020B0603020204020204" pitchFamily="34" charset="0"/>
-                <a:cs typeface="Arial" panose="020B0604020202020204" pitchFamily="34" charset="0"/>
-              </a:rPr>
-              <a:t>Alarm</a:t>
-            </a:r>
-          </a:p>
-        </p:txBody>
-      </p:sp>
-      <p:pic>
-        <p:nvPicPr>
-          <p:cNvPr id="60" name="Graphic 6">
-            <a:extLst>
-              <a:ext uri="{FF2B5EF4-FFF2-40B4-BE49-F238E27FC236}">
-                <a16:creationId xmlns:a16="http://schemas.microsoft.com/office/drawing/2014/main" id="{6825CAE7-27F5-475D-951A-A7245BA41857}"/>
-              </a:ext>
-            </a:extLst>
-          </p:cNvPr>
-          <p:cNvPicPr>
-            <a:picLocks noChangeAspect="1" noChangeArrowheads="1"/>
-          </p:cNvPicPr>
-          <p:nvPr/>
-        </p:nvPicPr>
-        <p:blipFill>
-          <a:blip r:embed="rId13" cstate="print">
-            <a:extLst>
-              <a:ext uri="{28A0092B-C50C-407E-A947-70E740481C1C}">
-                <a14:useLocalDpi xmlns:a14="http://schemas.microsoft.com/office/drawing/2010/main" val="0"/>
-              </a:ext>
-            </a:extLst>
-          </a:blip>
-          <a:srcRect/>
-          <a:stretch>
-            <a:fillRect/>
-          </a:stretch>
-        </p:blipFill>
-        <p:spPr bwMode="auto">
-          <a:xfrm>
-            <a:off x="8287524" y="2838468"/>
-            <a:ext cx="457200" cy="457200"/>
-          </a:xfrm>
-          <a:prstGeom prst="rect">
-            <a:avLst/>
-          </a:prstGeom>
-          <a:noFill/>
-          <a:ln>
-            <a:noFill/>
-          </a:ln>
-          <a:extLst>
-            <a:ext uri="{909E8E84-426E-40DD-AFC4-6F175D3DCCD1}">
-              <a14:hiddenFill xmlns:a14="http://schemas.microsoft.com/office/drawing/2010/main">
-                <a:solidFill>
-                  <a:srgbClr val="FFFFFF"/>
-                </a:solidFill>
-              </a14:hiddenFill>
-            </a:ext>
-            <a:ext uri="{91240B29-F687-4F45-9708-019B960494DF}">
-              <a14:hiddenLine xmlns:a14="http://schemas.microsoft.com/office/drawing/2010/main" w="9525">
-                <a:solidFill>
-                  <a:srgbClr val="000000"/>
-                </a:solidFill>
-                <a:miter lim="800000"/>
-                <a:headEnd/>
-                <a:tailEnd/>
-              </a14:hiddenLine>
-            </a:ext>
-          </a:extLst>
-        </p:spPr>
-      </p:pic>
-      <p:sp>
-        <p:nvSpPr>
           <p:cNvPr id="67" name="TextBox 31">
             <a:extLst>
               <a:ext uri="{FF2B5EF4-FFF2-40B4-BE49-F238E27FC236}">
@@ -6847,8 +7074,8 @@
         </p:nvSpPr>
         <p:spPr>
           <a:xfrm>
-            <a:off x="6066832" y="6345906"/>
-            <a:ext cx="1744327" cy="276999"/>
+            <a:off x="5907020" y="6345906"/>
+            <a:ext cx="2027285" cy="276999"/>
           </a:xfrm>
           <a:prstGeom prst="rect">
             <a:avLst/>
@@ -6867,7 +7094,7 @@
                 <a:latin typeface="Arial" panose="020B0604020202020204" pitchFamily="34" charset="0"/>
                 <a:cs typeface="Arial" panose="020B0604020202020204" pitchFamily="34" charset="0"/>
               </a:rPr>
-              <a:t>Darktrace appliance</a:t>
+              <a:t>Darktrace Master Instance</a:t>
             </a:r>
             <a:endParaRPr lang="en-US" sz="1200" dirty="0">
               <a:latin typeface="Arial" panose="020B0604020202020204" pitchFamily="34" charset="0"/>
@@ -6891,7 +7118,7 @@
           <p:nvPr/>
         </p:nvPicPr>
         <p:blipFill>
-          <a:blip r:embed="rId14">
+          <a:blip r:embed="rId13">
             <a:extLst>
               <a:ext uri="{28A0092B-C50C-407E-A947-70E740481C1C}">
                 <a14:useLocalDpi xmlns:a14="http://schemas.microsoft.com/office/drawing/2010/main" val="0"/>
@@ -7184,4 +7411,299 @@
     </a:ext>
   </a:extLst>
 </a:theme>
+</file>
+
+<file path=ppt/theme/theme2.xml><?xml version="1.0" encoding="utf-8"?>
+<a:theme xmlns:a="http://schemas.openxmlformats.org/drawingml/2006/main" name="Office Theme">
+  <a:themeElements>
+    <a:clrScheme name="Office">
+      <a:dk1>
+        <a:sysClr val="windowText" lastClr="000000"/>
+      </a:dk1>
+      <a:lt1>
+        <a:sysClr val="window" lastClr="FFFFFF"/>
+      </a:lt1>
+      <a:dk2>
+        <a:srgbClr val="44546A"/>
+      </a:dk2>
+      <a:lt2>
+        <a:srgbClr val="E7E6E6"/>
+      </a:lt2>
+      <a:accent1>
+        <a:srgbClr val="4472C4"/>
+      </a:accent1>
+      <a:accent2>
+        <a:srgbClr val="ED7D31"/>
+      </a:accent2>
+      <a:accent3>
+        <a:srgbClr val="A5A5A5"/>
+      </a:accent3>
+      <a:accent4>
+        <a:srgbClr val="FFC000"/>
+      </a:accent4>
+      <a:accent5>
+        <a:srgbClr val="5B9BD5"/>
+      </a:accent5>
+      <a:accent6>
+        <a:srgbClr val="70AD47"/>
+      </a:accent6>
+      <a:hlink>
+        <a:srgbClr val="0563C1"/>
+      </a:hlink>
+      <a:folHlink>
+        <a:srgbClr val="954F72"/>
+      </a:folHlink>
+    </a:clrScheme>
+    <a:fontScheme name="Office">
+      <a:majorFont>
+        <a:latin typeface="Calibri Light" panose="020F0302020204030204"/>
+        <a:ea typeface=""/>
+        <a:cs typeface=""/>
+        <a:font script="Jpan" typeface="游ゴシック Light"/>
+        <a:font script="Hang" typeface="맑은 고딕"/>
+        <a:font script="Hans" typeface="等线 Light"/>
+        <a:font script="Hant" typeface="新細明體"/>
+        <a:font script="Arab" typeface="Times New Roman"/>
+        <a:font script="Hebr" typeface="Times New Roman"/>
+        <a:font script="Thai" typeface="Angsana New"/>
+        <a:font script="Ethi" typeface="Nyala"/>
+        <a:font script="Beng" typeface="Vrinda"/>
+        <a:font script="Gujr" typeface="Shruti"/>
+        <a:font script="Khmr" typeface="MoolBoran"/>
+        <a:font script="Knda" typeface="Tunga"/>
+        <a:font script="Guru" typeface="Raavi"/>
+        <a:font script="Cans" typeface="Euphemia"/>
+        <a:font script="Cher" typeface="Plantagenet Cherokee"/>
+        <a:font script="Yiii" typeface="Microsoft Yi Baiti"/>
+        <a:font script="Tibt" typeface="Microsoft Himalaya"/>
+        <a:font script="Thaa" typeface="MV Boli"/>
+        <a:font script="Deva" typeface="Mangal"/>
+        <a:font script="Telu" typeface="Gautami"/>
+        <a:font script="Taml" typeface="Latha"/>
+        <a:font script="Syrc" typeface="Estrangelo Edessa"/>
+        <a:font script="Orya" typeface="Kalinga"/>
+        <a:font script="Mlym" typeface="Kartika"/>
+        <a:font script="Laoo" typeface="DokChampa"/>
+        <a:font script="Sinh" typeface="Iskoola Pota"/>
+        <a:font script="Mong" typeface="Mongolian Baiti"/>
+        <a:font script="Viet" typeface="Times New Roman"/>
+        <a:font script="Uigh" typeface="Microsoft Uighur"/>
+        <a:font script="Geor" typeface="Sylfaen"/>
+        <a:font script="Armn" typeface="Arial"/>
+        <a:font script="Bugi" typeface="Leelawadee UI"/>
+        <a:font script="Bopo" typeface="Microsoft JhengHei"/>
+        <a:font script="Java" typeface="Javanese Text"/>
+        <a:font script="Lisu" typeface="Segoe UI"/>
+        <a:font script="Mymr" typeface="Myanmar Text"/>
+        <a:font script="Nkoo" typeface="Ebrima"/>
+        <a:font script="Olck" typeface="Nirmala UI"/>
+        <a:font script="Osma" typeface="Ebrima"/>
+        <a:font script="Phag" typeface="Phagspa"/>
+        <a:font script="Syrn" typeface="Estrangelo Edessa"/>
+        <a:font script="Syrj" typeface="Estrangelo Edessa"/>
+        <a:font script="Syre" typeface="Estrangelo Edessa"/>
+        <a:font script="Sora" typeface="Nirmala UI"/>
+        <a:font script="Tale" typeface="Microsoft Tai Le"/>
+        <a:font script="Talu" typeface="Microsoft New Tai Lue"/>
+        <a:font script="Tfng" typeface="Ebrima"/>
+      </a:majorFont>
+      <a:minorFont>
+        <a:latin typeface="Calibri" panose="020F0502020204030204"/>
+        <a:ea typeface=""/>
+        <a:cs typeface=""/>
+        <a:font script="Jpan" typeface="游ゴシック"/>
+        <a:font script="Hang" typeface="맑은 고딕"/>
+        <a:font script="Hans" typeface="等线"/>
+        <a:font script="Hant" typeface="新細明體"/>
+        <a:font script="Arab" typeface="Arial"/>
+        <a:font script="Hebr" typeface="Arial"/>
+        <a:font script="Thai" typeface="Cordia New"/>
+        <a:font script="Ethi" typeface="Nyala"/>
+        <a:font script="Beng" typeface="Vrinda"/>
+        <a:font script="Gujr" typeface="Shruti"/>
+        <a:font script="Khmr" typeface="DaunPenh"/>
+        <a:font script="Knda" typeface="Tunga"/>
+        <a:font script="Guru" typeface="Raavi"/>
+        <a:font script="Cans" typeface="Euphemia"/>
+        <a:font script="Cher" typeface="Plantagenet Cherokee"/>
+        <a:font script="Yiii" typeface="Microsoft Yi Baiti"/>
+        <a:font script="Tibt" typeface="Microsoft Himalaya"/>
+        <a:font script="Thaa" typeface="MV Boli"/>
+        <a:font script="Deva" typeface="Mangal"/>
+        <a:font script="Telu" typeface="Gautami"/>
+        <a:font script="Taml" typeface="Latha"/>
+        <a:font script="Syrc" typeface="Estrangelo Edessa"/>
+        <a:font script="Orya" typeface="Kalinga"/>
+        <a:font script="Mlym" typeface="Kartika"/>
+        <a:font script="Laoo" typeface="DokChampa"/>
+        <a:font script="Sinh" typeface="Iskoola Pota"/>
+        <a:font script="Mong" typeface="Mongolian Baiti"/>
+        <a:font script="Viet" typeface="Arial"/>
+        <a:font script="Uigh" typeface="Microsoft Uighur"/>
+        <a:font script="Geor" typeface="Sylfaen"/>
+        <a:font script="Armn" typeface="Arial"/>
+        <a:font script="Bugi" typeface="Leelawadee UI"/>
+        <a:font script="Bopo" typeface="Microsoft JhengHei"/>
+        <a:font script="Java" typeface="Javanese Text"/>
+        <a:font script="Lisu" typeface="Segoe UI"/>
+        <a:font script="Mymr" typeface="Myanmar Text"/>
+        <a:font script="Nkoo" typeface="Ebrima"/>
+        <a:font script="Olck" typeface="Nirmala UI"/>
+        <a:font script="Osma" typeface="Ebrima"/>
+        <a:font script="Phag" typeface="Phagspa"/>
+        <a:font script="Syrn" typeface="Estrangelo Edessa"/>
+        <a:font script="Syrj" typeface="Estrangelo Edessa"/>
+        <a:font script="Syre" typeface="Estrangelo Edessa"/>
+        <a:font script="Sora" typeface="Nirmala UI"/>
+        <a:font script="Tale" typeface="Microsoft Tai Le"/>
+        <a:font script="Talu" typeface="Microsoft New Tai Lue"/>
+        <a:font script="Tfng" typeface="Ebrima"/>
+      </a:minorFont>
+    </a:fontScheme>
+    <a:fmtScheme name="Office">
+      <a:fillStyleLst>
+        <a:solidFill>
+          <a:schemeClr val="phClr"/>
+        </a:solidFill>
+        <a:gradFill rotWithShape="1">
+          <a:gsLst>
+            <a:gs pos="0">
+              <a:schemeClr val="phClr">
+                <a:lumMod val="110000"/>
+                <a:satMod val="105000"/>
+                <a:tint val="67000"/>
+              </a:schemeClr>
+            </a:gs>
+            <a:gs pos="50000">
+              <a:schemeClr val="phClr">
+                <a:lumMod val="105000"/>
+                <a:satMod val="103000"/>
+                <a:tint val="73000"/>
+              </a:schemeClr>
+            </a:gs>
+            <a:gs pos="100000">
+              <a:schemeClr val="phClr">
+                <a:lumMod val="105000"/>
+                <a:satMod val="109000"/>
+                <a:tint val="81000"/>
+              </a:schemeClr>
+            </a:gs>
+          </a:gsLst>
+          <a:lin ang="5400000" scaled="0"/>
+        </a:gradFill>
+        <a:gradFill rotWithShape="1">
+          <a:gsLst>
+            <a:gs pos="0">
+              <a:schemeClr val="phClr">
+                <a:satMod val="103000"/>
+                <a:lumMod val="102000"/>
+                <a:tint val="94000"/>
+              </a:schemeClr>
+            </a:gs>
+            <a:gs pos="50000">
+              <a:schemeClr val="phClr">
+                <a:satMod val="110000"/>
+                <a:lumMod val="100000"/>
+                <a:shade val="100000"/>
+              </a:schemeClr>
+            </a:gs>
+            <a:gs pos="100000">
+              <a:schemeClr val="phClr">
+                <a:lumMod val="99000"/>
+                <a:satMod val="120000"/>
+                <a:shade val="78000"/>
+              </a:schemeClr>
+            </a:gs>
+          </a:gsLst>
+          <a:lin ang="5400000" scaled="0"/>
+        </a:gradFill>
+      </a:fillStyleLst>
+      <a:lnStyleLst>
+        <a:ln w="6350" cap="flat" cmpd="sng" algn="ctr">
+          <a:solidFill>
+            <a:schemeClr val="phClr"/>
+          </a:solidFill>
+          <a:prstDash val="solid"/>
+          <a:miter lim="800000"/>
+        </a:ln>
+        <a:ln w="12700" cap="flat" cmpd="sng" algn="ctr">
+          <a:solidFill>
+            <a:schemeClr val="phClr"/>
+          </a:solidFill>
+          <a:prstDash val="solid"/>
+          <a:miter lim="800000"/>
+        </a:ln>
+        <a:ln w="19050" cap="flat" cmpd="sng" algn="ctr">
+          <a:solidFill>
+            <a:schemeClr val="phClr"/>
+          </a:solidFill>
+          <a:prstDash val="solid"/>
+          <a:miter lim="800000"/>
+        </a:ln>
+      </a:lnStyleLst>
+      <a:effectStyleLst>
+        <a:effectStyle>
+          <a:effectLst/>
+        </a:effectStyle>
+        <a:effectStyle>
+          <a:effectLst/>
+        </a:effectStyle>
+        <a:effectStyle>
+          <a:effectLst>
+            <a:outerShdw blurRad="57150" dist="19050" dir="5400000" algn="ctr" rotWithShape="0">
+              <a:srgbClr val="000000">
+                <a:alpha val="63000"/>
+              </a:srgbClr>
+            </a:outerShdw>
+          </a:effectLst>
+        </a:effectStyle>
+      </a:effectStyleLst>
+      <a:bgFillStyleLst>
+        <a:solidFill>
+          <a:schemeClr val="phClr"/>
+        </a:solidFill>
+        <a:solidFill>
+          <a:schemeClr val="phClr">
+            <a:tint val="95000"/>
+            <a:satMod val="170000"/>
+          </a:schemeClr>
+        </a:solidFill>
+        <a:gradFill rotWithShape="1">
+          <a:gsLst>
+            <a:gs pos="0">
+              <a:schemeClr val="phClr">
+                <a:tint val="93000"/>
+                <a:satMod val="150000"/>
+                <a:shade val="98000"/>
+                <a:lumMod val="102000"/>
+              </a:schemeClr>
+            </a:gs>
+            <a:gs pos="50000">
+              <a:schemeClr val="phClr">
+                <a:tint val="98000"/>
+                <a:satMod val="130000"/>
+                <a:shade val="90000"/>
+                <a:lumMod val="103000"/>
+              </a:schemeClr>
+            </a:gs>
+            <a:gs pos="100000">
+              <a:schemeClr val="phClr">
+                <a:shade val="63000"/>
+                <a:satMod val="120000"/>
+              </a:schemeClr>
+            </a:gs>
+          </a:gsLst>
+          <a:lin ang="5400000" scaled="0"/>
+        </a:gradFill>
+      </a:bgFillStyleLst>
+    </a:fmtScheme>
+  </a:themeElements>
+  <a:objectDefaults/>
+  <a:extraClrSchemeLst/>
+  <a:extLst>
+    <a:ext uri="{05A4C25C-085E-4340-85A3-A5531E510DB2}">
+      <thm15:themeFamily xmlns:thm15="http://schemas.microsoft.com/office/thememl/2012/main" name="Office Theme" id="{62F939B6-93AF-4DB8-9C6B-D6C7DFDC589F}" vid="{4A3C46E8-61CC-4603-A589-7422A47A8E4A}"/>
+    </a:ext>
+  </a:extLst>
+</a:theme>
 </file>
</xml_diff>